<commit_message>
slides for lesson 06
</commit_message>
<xml_diff>
--- a/doc/intro/slides/lesson_05_ejb.pptx
+++ b/doc/intro/slides/lesson_05_ejb.pptx
@@ -5,7 +5,7 @@
     <p:sldMasterId id="2147483648" r:id="rId1"/>
   </p:sldMasterIdLst>
   <p:notesMasterIdLst>
-    <p:notesMasterId r:id="rId14"/>
+    <p:notesMasterId r:id="rId15"/>
   </p:notesMasterIdLst>
   <p:sldIdLst>
     <p:sldId id="256" r:id="rId2"/>
@@ -15,11 +15,12 @@
     <p:sldId id="278" r:id="rId6"/>
     <p:sldId id="279" r:id="rId7"/>
     <p:sldId id="280" r:id="rId8"/>
-    <p:sldId id="281" r:id="rId9"/>
-    <p:sldId id="282" r:id="rId10"/>
-    <p:sldId id="283" r:id="rId11"/>
-    <p:sldId id="284" r:id="rId12"/>
-    <p:sldId id="271" r:id="rId13"/>
+    <p:sldId id="285" r:id="rId9"/>
+    <p:sldId id="281" r:id="rId10"/>
+    <p:sldId id="282" r:id="rId11"/>
+    <p:sldId id="283" r:id="rId12"/>
+    <p:sldId id="284" r:id="rId13"/>
+    <p:sldId id="271" r:id="rId14"/>
   </p:sldIdLst>
   <p:sldSz cx="12192000" cy="6858000"/>
   <p:notesSz cx="6858000" cy="9144000"/>
@@ -208,7 +209,7 @@
           <a:p>
             <a:fld id="{9B5B52BA-3295-0343-9E28-A260A811DD10}" type="datetimeFigureOut">
               <a:rPr lang="en-US" smtClean="0"/>
-              <a:t>1/17/18</a:t>
+              <a:t>1/18/18</a:t>
             </a:fld>
             <a:endParaRPr lang="en-US"/>
           </a:p>
@@ -607,7 +608,7 @@
           <a:p>
             <a:fld id="{04F1D4A2-813C-F741-B481-C92B3A596030}" type="datetimeFigureOut">
               <a:rPr lang="en-US" smtClean="0"/>
-              <a:t>1/17/18</a:t>
+              <a:t>1/18/18</a:t>
             </a:fld>
             <a:endParaRPr lang="en-US"/>
           </a:p>
@@ -777,7 +778,7 @@
           <a:p>
             <a:fld id="{04F1D4A2-813C-F741-B481-C92B3A596030}" type="datetimeFigureOut">
               <a:rPr lang="en-US" smtClean="0"/>
-              <a:t>1/17/18</a:t>
+              <a:t>1/18/18</a:t>
             </a:fld>
             <a:endParaRPr lang="en-US"/>
           </a:p>
@@ -957,7 +958,7 @@
           <a:p>
             <a:fld id="{04F1D4A2-813C-F741-B481-C92B3A596030}" type="datetimeFigureOut">
               <a:rPr lang="en-US" smtClean="0"/>
-              <a:t>1/17/18</a:t>
+              <a:t>1/18/18</a:t>
             </a:fld>
             <a:endParaRPr lang="en-US"/>
           </a:p>
@@ -1138,7 +1139,7 @@
           <a:p>
             <a:fld id="{04F1D4A2-813C-F741-B481-C92B3A596030}" type="datetimeFigureOut">
               <a:rPr lang="en-US" smtClean="0"/>
-              <a:t>1/17/18</a:t>
+              <a:t>1/18/18</a:t>
             </a:fld>
             <a:endParaRPr lang="en-US"/>
           </a:p>
@@ -1384,7 +1385,7 @@
           <a:p>
             <a:fld id="{04F1D4A2-813C-F741-B481-C92B3A596030}" type="datetimeFigureOut">
               <a:rPr lang="en-US" smtClean="0"/>
-              <a:t>1/17/18</a:t>
+              <a:t>1/18/18</a:t>
             </a:fld>
             <a:endParaRPr lang="en-US"/>
           </a:p>
@@ -1616,7 +1617,7 @@
           <a:p>
             <a:fld id="{04F1D4A2-813C-F741-B481-C92B3A596030}" type="datetimeFigureOut">
               <a:rPr lang="en-US" smtClean="0"/>
-              <a:t>1/17/18</a:t>
+              <a:t>1/18/18</a:t>
             </a:fld>
             <a:endParaRPr lang="en-US"/>
           </a:p>
@@ -1983,7 +1984,7 @@
           <a:p>
             <a:fld id="{04F1D4A2-813C-F741-B481-C92B3A596030}" type="datetimeFigureOut">
               <a:rPr lang="en-US" smtClean="0"/>
-              <a:t>1/17/18</a:t>
+              <a:t>1/18/18</a:t>
             </a:fld>
             <a:endParaRPr lang="en-US"/>
           </a:p>
@@ -2101,7 +2102,7 @@
           <a:p>
             <a:fld id="{04F1D4A2-813C-F741-B481-C92B3A596030}" type="datetimeFigureOut">
               <a:rPr lang="en-US" smtClean="0"/>
-              <a:t>1/17/18</a:t>
+              <a:t>1/18/18</a:t>
             </a:fld>
             <a:endParaRPr lang="en-US"/>
           </a:p>
@@ -2196,7 +2197,7 @@
           <a:p>
             <a:fld id="{04F1D4A2-813C-F741-B481-C92B3A596030}" type="datetimeFigureOut">
               <a:rPr lang="en-US" smtClean="0"/>
-              <a:t>1/17/18</a:t>
+              <a:t>1/18/18</a:t>
             </a:fld>
             <a:endParaRPr lang="en-US"/>
           </a:p>
@@ -2473,7 +2474,7 @@
           <a:p>
             <a:fld id="{04F1D4A2-813C-F741-B481-C92B3A596030}" type="datetimeFigureOut">
               <a:rPr lang="en-US" smtClean="0"/>
-              <a:t>1/17/18</a:t>
+              <a:t>1/18/18</a:t>
             </a:fld>
             <a:endParaRPr lang="en-US"/>
           </a:p>
@@ -2726,7 +2727,7 @@
           <a:p>
             <a:fld id="{04F1D4A2-813C-F741-B481-C92B3A596030}" type="datetimeFigureOut">
               <a:rPr lang="en-US" smtClean="0"/>
-              <a:t>1/17/18</a:t>
+              <a:t>1/18/18</a:t>
             </a:fld>
             <a:endParaRPr lang="en-US"/>
           </a:p>
@@ -2939,7 +2940,7 @@
           <a:p>
             <a:fld id="{04F1D4A2-813C-F741-B481-C92B3A596030}" type="datetimeFigureOut">
               <a:rPr lang="en-US" smtClean="0"/>
-              <a:t>1/17/18</a:t>
+              <a:t>1/18/18</a:t>
             </a:fld>
             <a:endParaRPr lang="en-US"/>
           </a:p>
@@ -3377,15 +3378,7 @@
             </a:br>
             <a:r>
               <a:rPr lang="en-US" dirty="0" smtClean="0"/>
-              <a:t>Lesson </a:t>
-            </a:r>
-            <a:r>
-              <a:rPr lang="en-US" dirty="0" smtClean="0"/>
-              <a:t>05: </a:t>
-            </a:r>
-            <a:r>
-              <a:rPr lang="en-US" dirty="0" smtClean="0"/>
-              <a:t>EJB</a:t>
+              <a:t>Lesson 05: EJB</a:t>
             </a:r>
             <a:endParaRPr lang="en-US" dirty="0"/>
           </a:p>
@@ -3450,6 +3443,129 @@
 </file>
 
 <file path=ppt/slides/slide10.xml><?xml version="1.0" encoding="utf-8"?>
+<p:sld xmlns:a="http://schemas.openxmlformats.org/drawingml/2006/main" xmlns:r="http://schemas.openxmlformats.org/officeDocument/2006/relationships" xmlns:p="http://schemas.openxmlformats.org/presentationml/2006/main">
+  <p:cSld>
+    <p:spTree>
+      <p:nvGrpSpPr>
+        <p:cNvPr id="1" name=""/>
+        <p:cNvGrpSpPr/>
+        <p:nvPr/>
+      </p:nvGrpSpPr>
+      <p:grpSpPr>
+        <a:xfrm>
+          <a:off x="0" y="0"/>
+          <a:ext cx="0" cy="0"/>
+          <a:chOff x="0" y="0"/>
+          <a:chExt cx="0" cy="0"/>
+        </a:xfrm>
+      </p:grpSpPr>
+      <p:sp>
+        <p:nvSpPr>
+          <p:cNvPr id="2" name="Title 1"/>
+          <p:cNvSpPr>
+            <a:spLocks noGrp="1"/>
+          </p:cNvSpPr>
+          <p:nvPr>
+            <p:ph type="title"/>
+          </p:nvPr>
+        </p:nvSpPr>
+        <p:spPr/>
+        <p:txBody>
+          <a:bodyPr/>
+          <a:lstStyle/>
+          <a:p>
+            <a:r>
+              <a:rPr lang="en-US" dirty="0" err="1" smtClean="0"/>
+              <a:t>Arquillian</a:t>
+            </a:r>
+            <a:r>
+              <a:rPr lang="en-US" dirty="0" smtClean="0"/>
+              <a:t>	</a:t>
+            </a:r>
+            <a:endParaRPr lang="en-US" dirty="0"/>
+          </a:p>
+        </p:txBody>
+      </p:sp>
+      <p:sp>
+        <p:nvSpPr>
+          <p:cNvPr id="3" name="Content Placeholder 2"/>
+          <p:cNvSpPr>
+            <a:spLocks noGrp="1"/>
+          </p:cNvSpPr>
+          <p:nvPr>
+            <p:ph idx="1"/>
+          </p:nvPr>
+        </p:nvSpPr>
+        <p:spPr>
+          <a:xfrm>
+            <a:off x="139849" y="1825624"/>
+            <a:ext cx="11919473" cy="5032376"/>
+          </a:xfrm>
+        </p:spPr>
+        <p:txBody>
+          <a:bodyPr/>
+          <a:lstStyle/>
+          <a:p>
+            <a:r>
+              <a:rPr lang="en-US" dirty="0" smtClean="0"/>
+              <a:t>A library extending JUnit that allows you to package JAR/WAR files directly from tests and deploy them on a container</a:t>
+            </a:r>
+          </a:p>
+          <a:p>
+            <a:r>
+              <a:rPr lang="en-US" dirty="0" smtClean="0"/>
+              <a:t>The tests themselves are run in the container, so can use dependency injection @EJB </a:t>
+            </a:r>
+          </a:p>
+          <a:p>
+            <a:r>
+              <a:rPr lang="en-US" dirty="0" smtClean="0"/>
+              <a:t>Configuration in special resource file called </a:t>
+            </a:r>
+            <a:r>
+              <a:rPr lang="en-US" i="1" dirty="0" err="1" smtClean="0"/>
+              <a:t>arquillian.xml</a:t>
+            </a:r>
+            <a:endParaRPr lang="en-US" dirty="0" smtClean="0"/>
+          </a:p>
+          <a:p>
+            <a:r>
+              <a:rPr lang="en-US" dirty="0" smtClean="0"/>
+              <a:t>Limitations: cannot just right-click in IDE to run tests, need some manual settings first</a:t>
+            </a:r>
+            <a:r>
+              <a:rPr lang="mr-IN" dirty="0" smtClean="0"/>
+              <a:t>…</a:t>
+            </a:r>
+            <a:endParaRPr lang="en-US" dirty="0" smtClean="0"/>
+          </a:p>
+          <a:p>
+            <a:r>
+              <a:rPr lang="mr-IN" dirty="0" smtClean="0"/>
+              <a:t>…</a:t>
+            </a:r>
+            <a:r>
+              <a:rPr lang="en-US" dirty="0" smtClean="0"/>
+              <a:t> plus, you still need to download and install a JEE Container </a:t>
+            </a:r>
+            <a:endParaRPr lang="en-US" dirty="0"/>
+          </a:p>
+        </p:txBody>
+      </p:sp>
+    </p:spTree>
+    <p:extLst>
+      <p:ext uri="{BB962C8B-B14F-4D97-AF65-F5344CB8AC3E}">
+        <p14:creationId xmlns:p14="http://schemas.microsoft.com/office/powerpoint/2010/main" val="94913341"/>
+      </p:ext>
+    </p:extLst>
+  </p:cSld>
+  <p:clrMapOvr>
+    <a:masterClrMapping/>
+  </p:clrMapOvr>
+</p:sld>
+</file>
+
+<file path=ppt/slides/slide11.xml><?xml version="1.0" encoding="utf-8"?>
 <p:sld xmlns:a="http://schemas.openxmlformats.org/drawingml/2006/main" xmlns:r="http://schemas.openxmlformats.org/officeDocument/2006/relationships" xmlns:p="http://schemas.openxmlformats.org/presentationml/2006/main">
   <p:cSld>
     <p:spTree>
@@ -3610,138 +3726,6 @@
 </p:sld>
 </file>
 
-<file path=ppt/slides/slide11.xml><?xml version="1.0" encoding="utf-8"?>
-<p:sld xmlns:a="http://schemas.openxmlformats.org/drawingml/2006/main" xmlns:r="http://schemas.openxmlformats.org/officeDocument/2006/relationships" xmlns:p="http://schemas.openxmlformats.org/presentationml/2006/main">
-  <p:cSld>
-    <p:spTree>
-      <p:nvGrpSpPr>
-        <p:cNvPr id="1" name=""/>
-        <p:cNvGrpSpPr/>
-        <p:nvPr/>
-      </p:nvGrpSpPr>
-      <p:grpSpPr>
-        <a:xfrm>
-          <a:off x="0" y="0"/>
-          <a:ext cx="0" cy="0"/>
-          <a:chOff x="0" y="0"/>
-          <a:chExt cx="0" cy="0"/>
-        </a:xfrm>
-      </p:grpSpPr>
-      <p:sp>
-        <p:nvSpPr>
-          <p:cNvPr id="2" name="Title 1"/>
-          <p:cNvSpPr>
-            <a:spLocks noGrp="1"/>
-          </p:cNvSpPr>
-          <p:nvPr>
-            <p:ph type="title"/>
-          </p:nvPr>
-        </p:nvSpPr>
-        <p:spPr/>
-        <p:txBody>
-          <a:bodyPr/>
-          <a:lstStyle/>
-          <a:p>
-            <a:r>
-              <a:rPr lang="en-US" dirty="0" smtClean="0"/>
-              <a:t>Download/Install </a:t>
-            </a:r>
-            <a:r>
-              <a:rPr lang="en-US" dirty="0" err="1" smtClean="0"/>
-              <a:t>WildFly</a:t>
-            </a:r>
-            <a:endParaRPr lang="en-US" dirty="0"/>
-          </a:p>
-        </p:txBody>
-      </p:sp>
-      <p:sp>
-        <p:nvSpPr>
-          <p:cNvPr id="3" name="Content Placeholder 2"/>
-          <p:cNvSpPr>
-            <a:spLocks noGrp="1"/>
-          </p:cNvSpPr>
-          <p:nvPr>
-            <p:ph idx="1"/>
-          </p:nvPr>
-        </p:nvSpPr>
-        <p:spPr>
-          <a:xfrm>
-            <a:off x="344245" y="1825624"/>
-            <a:ext cx="11607501" cy="4930178"/>
-          </a:xfrm>
-        </p:spPr>
-        <p:txBody>
-          <a:bodyPr/>
-          <a:lstStyle/>
-          <a:p>
-            <a:r>
-              <a:rPr lang="en-US" dirty="0" smtClean="0"/>
-              <a:t>We do it with Maven plugin, as part of the build</a:t>
-            </a:r>
-          </a:p>
-          <a:p>
-            <a:r>
-              <a:rPr lang="en-US" dirty="0" err="1" smtClean="0"/>
-              <a:t>WildFly</a:t>
-            </a:r>
-            <a:r>
-              <a:rPr lang="en-US" dirty="0" smtClean="0"/>
-              <a:t> installed under the “target” folder</a:t>
-            </a:r>
-          </a:p>
-          <a:p>
-            <a:pPr lvl="1"/>
-            <a:r>
-              <a:rPr lang="en-US" dirty="0" smtClean="0"/>
-              <a:t>So it would be deleted when running “</a:t>
-            </a:r>
-            <a:r>
-              <a:rPr lang="en-US" dirty="0" err="1" smtClean="0"/>
-              <a:t>mvn</a:t>
-            </a:r>
-            <a:r>
-              <a:rPr lang="en-US" dirty="0" smtClean="0"/>
-              <a:t> clean”</a:t>
-            </a:r>
-          </a:p>
-          <a:p>
-            <a:r>
-              <a:rPr lang="en-US" dirty="0" smtClean="0"/>
-              <a:t>Need to run “</a:t>
-            </a:r>
-            <a:r>
-              <a:rPr lang="en-US" dirty="0" err="1" smtClean="0"/>
-              <a:t>mvn</a:t>
-            </a:r>
-            <a:r>
-              <a:rPr lang="en-US" dirty="0" smtClean="0"/>
-              <a:t> test” at least once to download/install </a:t>
-            </a:r>
-            <a:r>
-              <a:rPr lang="en-US" dirty="0" err="1" smtClean="0"/>
-              <a:t>WildFly</a:t>
-            </a:r>
-            <a:r>
-              <a:rPr lang="en-US" dirty="0" smtClean="0"/>
-              <a:t> BEFORE you can run tests in IntelliJ</a:t>
-            </a:r>
-            <a:endParaRPr lang="en-US" dirty="0"/>
-          </a:p>
-        </p:txBody>
-      </p:sp>
-    </p:spTree>
-    <p:extLst>
-      <p:ext uri="{BB962C8B-B14F-4D97-AF65-F5344CB8AC3E}">
-        <p14:creationId xmlns:p14="http://schemas.microsoft.com/office/powerpoint/2010/main" val="2094652539"/>
-      </p:ext>
-    </p:extLst>
-  </p:cSld>
-  <p:clrMapOvr>
-    <a:masterClrMapping/>
-  </p:clrMapOvr>
-</p:sld>
-</file>
-
 <file path=ppt/slides/slide12.xml><?xml version="1.0" encoding="utf-8"?>
 <p:sld xmlns:a="http://schemas.openxmlformats.org/drawingml/2006/main" xmlns:r="http://schemas.openxmlformats.org/officeDocument/2006/relationships" xmlns:p="http://schemas.openxmlformats.org/presentationml/2006/main">
   <p:cSld>
@@ -3761,6 +3745,138 @@
       </p:grpSpPr>
       <p:sp>
         <p:nvSpPr>
+          <p:cNvPr id="2" name="Title 1"/>
+          <p:cNvSpPr>
+            <a:spLocks noGrp="1"/>
+          </p:cNvSpPr>
+          <p:nvPr>
+            <p:ph type="title"/>
+          </p:nvPr>
+        </p:nvSpPr>
+        <p:spPr/>
+        <p:txBody>
+          <a:bodyPr/>
+          <a:lstStyle/>
+          <a:p>
+            <a:r>
+              <a:rPr lang="en-US" dirty="0" smtClean="0"/>
+              <a:t>Download/Install </a:t>
+            </a:r>
+            <a:r>
+              <a:rPr lang="en-US" dirty="0" err="1" smtClean="0"/>
+              <a:t>WildFly</a:t>
+            </a:r>
+            <a:endParaRPr lang="en-US" dirty="0"/>
+          </a:p>
+        </p:txBody>
+      </p:sp>
+      <p:sp>
+        <p:nvSpPr>
+          <p:cNvPr id="3" name="Content Placeholder 2"/>
+          <p:cNvSpPr>
+            <a:spLocks noGrp="1"/>
+          </p:cNvSpPr>
+          <p:nvPr>
+            <p:ph idx="1"/>
+          </p:nvPr>
+        </p:nvSpPr>
+        <p:spPr>
+          <a:xfrm>
+            <a:off x="344245" y="1825624"/>
+            <a:ext cx="11607501" cy="4930178"/>
+          </a:xfrm>
+        </p:spPr>
+        <p:txBody>
+          <a:bodyPr/>
+          <a:lstStyle/>
+          <a:p>
+            <a:r>
+              <a:rPr lang="en-US" dirty="0" smtClean="0"/>
+              <a:t>We do it with Maven plugin, as part of the build</a:t>
+            </a:r>
+          </a:p>
+          <a:p>
+            <a:r>
+              <a:rPr lang="en-US" dirty="0" err="1" smtClean="0"/>
+              <a:t>WildFly</a:t>
+            </a:r>
+            <a:r>
+              <a:rPr lang="en-US" dirty="0" smtClean="0"/>
+              <a:t> installed under the “target” folder</a:t>
+            </a:r>
+          </a:p>
+          <a:p>
+            <a:pPr lvl="1"/>
+            <a:r>
+              <a:rPr lang="en-US" dirty="0" smtClean="0"/>
+              <a:t>So it would be deleted when running “</a:t>
+            </a:r>
+            <a:r>
+              <a:rPr lang="en-US" dirty="0" err="1" smtClean="0"/>
+              <a:t>mvn</a:t>
+            </a:r>
+            <a:r>
+              <a:rPr lang="en-US" dirty="0" smtClean="0"/>
+              <a:t> clean”</a:t>
+            </a:r>
+          </a:p>
+          <a:p>
+            <a:r>
+              <a:rPr lang="en-US" dirty="0" smtClean="0"/>
+              <a:t>Need to run “</a:t>
+            </a:r>
+            <a:r>
+              <a:rPr lang="en-US" dirty="0" err="1" smtClean="0"/>
+              <a:t>mvn</a:t>
+            </a:r>
+            <a:r>
+              <a:rPr lang="en-US" dirty="0" smtClean="0"/>
+              <a:t> test” at least once to download/install </a:t>
+            </a:r>
+            <a:r>
+              <a:rPr lang="en-US" dirty="0" err="1" smtClean="0"/>
+              <a:t>WildFly</a:t>
+            </a:r>
+            <a:r>
+              <a:rPr lang="en-US" dirty="0" smtClean="0"/>
+              <a:t> BEFORE you can run tests in IntelliJ</a:t>
+            </a:r>
+            <a:endParaRPr lang="en-US" dirty="0"/>
+          </a:p>
+        </p:txBody>
+      </p:sp>
+    </p:spTree>
+    <p:extLst>
+      <p:ext uri="{BB962C8B-B14F-4D97-AF65-F5344CB8AC3E}">
+        <p14:creationId xmlns:p14="http://schemas.microsoft.com/office/powerpoint/2010/main" val="2094652539"/>
+      </p:ext>
+    </p:extLst>
+  </p:cSld>
+  <p:clrMapOvr>
+    <a:masterClrMapping/>
+  </p:clrMapOvr>
+</p:sld>
+</file>
+
+<file path=ppt/slides/slide13.xml><?xml version="1.0" encoding="utf-8"?>
+<p:sld xmlns:a="http://schemas.openxmlformats.org/drawingml/2006/main" xmlns:r="http://schemas.openxmlformats.org/officeDocument/2006/relationships" xmlns:p="http://schemas.openxmlformats.org/presentationml/2006/main">
+  <p:cSld>
+    <p:spTree>
+      <p:nvGrpSpPr>
+        <p:cNvPr id="1" name=""/>
+        <p:cNvGrpSpPr/>
+        <p:nvPr/>
+      </p:nvGrpSpPr>
+      <p:grpSpPr>
+        <a:xfrm>
+          <a:off x="0" y="0"/>
+          <a:ext cx="0" cy="0"/>
+          <a:chOff x="0" y="0"/>
+          <a:chExt cx="0" cy="0"/>
+        </a:xfrm>
+      </p:grpSpPr>
+      <p:sp>
+        <p:nvSpPr>
           <p:cNvPr id="4" name="Title 3"/>
           <p:cNvSpPr>
             <a:spLocks noGrp="1"/>
@@ -3938,19 +4054,7 @@
           <a:p>
             <a:r>
               <a:rPr lang="en-US" dirty="0" smtClean="0"/>
-              <a:t>Exercises </a:t>
-            </a:r>
-            <a:r>
-              <a:rPr lang="en-US" dirty="0" smtClean="0"/>
-              <a:t>for Lesson </a:t>
-            </a:r>
-            <a:r>
-              <a:rPr lang="en-US" dirty="0" smtClean="0"/>
-              <a:t>05 </a:t>
-            </a:r>
-            <a:r>
-              <a:rPr lang="en-US" dirty="0" smtClean="0"/>
-              <a:t>(see documentation)</a:t>
+              <a:t>Exercises for Lesson 05 (see documentation)</a:t>
             </a:r>
             <a:endParaRPr lang="en-US" dirty="0"/>
           </a:p>
@@ -4769,8 +4873,12 @@
           <a:lstStyle/>
           <a:p>
             <a:r>
-              <a:rPr lang="en-US" dirty="0" smtClean="0"/>
-              <a:t>Container Deployment	</a:t>
+              <a:rPr lang="en-US" dirty="0"/>
+              <a:t>@</a:t>
+            </a:r>
+            <a:r>
+              <a:rPr lang="en-US" dirty="0" err="1"/>
+              <a:t>PostConstruct</a:t>
             </a:r>
             <a:endParaRPr lang="en-US" dirty="0"/>
           </a:p>
@@ -4788,62 +4896,72 @@
         </p:nvSpPr>
         <p:spPr>
           <a:xfrm>
-            <a:off x="258184" y="1825624"/>
-            <a:ext cx="11736592" cy="4940936"/>
+            <a:off x="288324" y="1825624"/>
+            <a:ext cx="11788346" cy="4863499"/>
           </a:xfrm>
         </p:spPr>
         <p:txBody>
-          <a:bodyPr/>
-          <a:lstStyle/>
-          <a:p>
-            <a:r>
-              <a:rPr lang="en-US" dirty="0" smtClean="0"/>
-              <a:t>To use EJBs, we need to run them in a JEE Container</a:t>
+          <a:bodyPr>
+            <a:normAutofit lnSpcReduction="10000"/>
+          </a:bodyPr>
+          <a:lstStyle/>
+          <a:p>
+            <a:r>
+              <a:rPr lang="en-US" dirty="0" smtClean="0"/>
+              <a:t>The Container, before doing dependency injection, needs to create an instance of the EJB with “new”</a:t>
+            </a:r>
+          </a:p>
+          <a:p>
+            <a:r>
+              <a:rPr lang="en-US" dirty="0" smtClean="0"/>
+              <a:t>This means that the code of the </a:t>
+            </a:r>
+            <a:r>
+              <a:rPr lang="en-US" i="1" dirty="0" smtClean="0"/>
+              <a:t>constructor</a:t>
+            </a:r>
+            <a:r>
+              <a:rPr lang="en-US" dirty="0" smtClean="0"/>
+              <a:t> is called BEFORE dependency injection (DI) is done</a:t>
+            </a:r>
+          </a:p>
+          <a:p>
+            <a:r>
+              <a:rPr lang="en-US" dirty="0" smtClean="0"/>
+              <a:t>If you need to access an injected variable in the constructor, you will hence get a null pointer exception</a:t>
+            </a:r>
+          </a:p>
+          <a:p>
+            <a:r>
+              <a:rPr lang="en-US" dirty="0" smtClean="0"/>
+              <a:t>A method marked with </a:t>
+            </a:r>
+            <a:r>
+              <a:rPr lang="en-US" dirty="0"/>
+              <a:t>@</a:t>
+            </a:r>
+            <a:r>
+              <a:rPr lang="en-US" dirty="0" err="1" smtClean="0"/>
+              <a:t>PostConstruct</a:t>
+            </a:r>
+            <a:r>
+              <a:rPr lang="en-US" dirty="0" smtClean="0"/>
+              <a:t> will be executed AFTER the constructor and DI </a:t>
             </a:r>
           </a:p>
           <a:p>
             <a:pPr lvl="1"/>
             <a:r>
-              <a:rPr lang="en-US" dirty="0" err="1" smtClean="0"/>
-              <a:t>Wildfly</a:t>
-            </a:r>
-            <a:r>
-              <a:rPr lang="en-US" dirty="0" smtClean="0"/>
-              <a:t>, </a:t>
-            </a:r>
-            <a:r>
-              <a:rPr lang="en-US" dirty="0" err="1" smtClean="0"/>
-              <a:t>GlassFish</a:t>
-            </a:r>
-            <a:r>
-              <a:rPr lang="en-US" dirty="0" smtClean="0"/>
-              <a:t>, </a:t>
-            </a:r>
-            <a:r>
-              <a:rPr lang="en-US" dirty="0" err="1" smtClean="0"/>
-              <a:t>Payara</a:t>
-            </a:r>
-            <a:r>
-              <a:rPr lang="en-US" dirty="0" smtClean="0"/>
-              <a:t>, etc.</a:t>
-            </a:r>
-          </a:p>
-          <a:p>
-            <a:r>
-              <a:rPr lang="en-US" dirty="0" smtClean="0"/>
-              <a:t>We would need to package the JAR/WAR with our code, install it on a running container</a:t>
-            </a:r>
-          </a:p>
-          <a:p>
-            <a:r>
-              <a:rPr lang="en-US" dirty="0" smtClean="0"/>
-              <a:t>But before that, we would need to download, install and start a container</a:t>
-            </a:r>
-          </a:p>
-          <a:p>
-            <a:r>
-              <a:rPr lang="en-US" dirty="0" smtClean="0"/>
-              <a:t>But how to test the methods of EJBs directly from a JUnit test?</a:t>
+              <a:rPr lang="en-US" dirty="0"/>
+              <a:t>s</a:t>
+            </a:r>
+            <a:r>
+              <a:rPr lang="en-US" dirty="0" smtClean="0"/>
+              <a:t>o, useful when you need initializing code relying on </a:t>
+            </a:r>
+            <a:r>
+              <a:rPr lang="en-US" smtClean="0"/>
+              <a:t>injected variables</a:t>
             </a:r>
             <a:endParaRPr lang="en-US" dirty="0"/>
           </a:p>
@@ -4852,7 +4970,7 @@
     </p:spTree>
     <p:extLst>
       <p:ext uri="{BB962C8B-B14F-4D97-AF65-F5344CB8AC3E}">
-        <p14:creationId xmlns:p14="http://schemas.microsoft.com/office/powerpoint/2010/main" val="300750010"/>
+        <p14:creationId xmlns:p14="http://schemas.microsoft.com/office/powerpoint/2010/main" val="371969169"/>
       </p:ext>
     </p:extLst>
   </p:cSld>
@@ -4895,12 +5013,8 @@
           <a:lstStyle/>
           <a:p>
             <a:r>
-              <a:rPr lang="en-US" dirty="0" err="1" smtClean="0"/>
-              <a:t>Arquillian</a:t>
-            </a:r>
-            <a:r>
-              <a:rPr lang="en-US" dirty="0" smtClean="0"/>
-              <a:t>	</a:t>
+              <a:rPr lang="en-US" dirty="0" smtClean="0"/>
+              <a:t>Container Deployment	</a:t>
             </a:r>
             <a:endParaRPr lang="en-US" dirty="0"/>
           </a:p>
@@ -4918,8 +5032,8 @@
         </p:nvSpPr>
         <p:spPr>
           <a:xfrm>
-            <a:off x="139849" y="1825624"/>
-            <a:ext cx="11919473" cy="5032376"/>
+            <a:off x="258184" y="1825624"/>
+            <a:ext cx="11736592" cy="4940936"/>
           </a:xfrm>
         </p:spPr>
         <p:txBody>
@@ -4928,45 +5042,52 @@
           <a:p>
             <a:r>
               <a:rPr lang="en-US" dirty="0" smtClean="0"/>
-              <a:t>A library extending JUnit that allows you to package JAR/WAR files directly from tests and deploy them on a container</a:t>
-            </a:r>
-          </a:p>
-          <a:p>
-            <a:r>
-              <a:rPr lang="en-US" dirty="0" smtClean="0"/>
-              <a:t>The tests themselves are run in the container, so can use dependency injection @EJB </a:t>
-            </a:r>
-          </a:p>
-          <a:p>
-            <a:r>
-              <a:rPr lang="en-US" dirty="0" smtClean="0"/>
-              <a:t>Configuration in special resource file called </a:t>
-            </a:r>
-            <a:r>
-              <a:rPr lang="en-US" i="1" dirty="0" err="1" smtClean="0"/>
-              <a:t>arquillian.xml</a:t>
-            </a:r>
-            <a:endParaRPr lang="en-US" dirty="0" smtClean="0"/>
-          </a:p>
-          <a:p>
-            <a:r>
-              <a:rPr lang="en-US" dirty="0" smtClean="0"/>
-              <a:t>Limitations: cannot just right-click in IDE to run tests, need some manual settings first</a:t>
-            </a:r>
-            <a:r>
-              <a:rPr lang="mr-IN" dirty="0" smtClean="0"/>
-              <a:t>…</a:t>
-            </a:r>
-            <a:endParaRPr lang="en-US" dirty="0" smtClean="0"/>
-          </a:p>
-          <a:p>
-            <a:r>
-              <a:rPr lang="mr-IN" dirty="0" smtClean="0"/>
-              <a:t>…</a:t>
-            </a:r>
-            <a:r>
-              <a:rPr lang="en-US" dirty="0" smtClean="0"/>
-              <a:t> plus, you still need to download and install a JEE Container </a:t>
+              <a:t>To use EJBs, we need to run them in a JEE Container</a:t>
+            </a:r>
+          </a:p>
+          <a:p>
+            <a:pPr lvl="1"/>
+            <a:r>
+              <a:rPr lang="en-US" dirty="0" err="1" smtClean="0"/>
+              <a:t>Wildfly</a:t>
+            </a:r>
+            <a:r>
+              <a:rPr lang="en-US" dirty="0" smtClean="0"/>
+              <a:t>, </a:t>
+            </a:r>
+            <a:r>
+              <a:rPr lang="en-US" dirty="0" err="1" smtClean="0"/>
+              <a:t>GlassFish</a:t>
+            </a:r>
+            <a:r>
+              <a:rPr lang="en-US" dirty="0" smtClean="0"/>
+              <a:t>, </a:t>
+            </a:r>
+            <a:r>
+              <a:rPr lang="en-US" dirty="0" err="1" smtClean="0"/>
+              <a:t>Payara</a:t>
+            </a:r>
+            <a:r>
+              <a:rPr lang="en-US" dirty="0" smtClean="0"/>
+              <a:t>, etc.</a:t>
+            </a:r>
+          </a:p>
+          <a:p>
+            <a:r>
+              <a:rPr lang="en-US" dirty="0" smtClean="0"/>
+              <a:t>We would need to package the JAR/WAR with our code, install it on a running container</a:t>
+            </a:r>
+          </a:p>
+          <a:p>
+            <a:r>
+              <a:rPr lang="en-US" dirty="0" smtClean="0"/>
+              <a:t>But before that, we would need to download, install and start a container</a:t>
+            </a:r>
+          </a:p>
+          <a:p>
+            <a:r>
+              <a:rPr lang="en-US" dirty="0" smtClean="0"/>
+              <a:t>But how to test the methods of EJBs directly from a JUnit test?</a:t>
             </a:r>
             <a:endParaRPr lang="en-US" dirty="0"/>
           </a:p>
@@ -4975,7 +5096,7 @@
     </p:spTree>
     <p:extLst>
       <p:ext uri="{BB962C8B-B14F-4D97-AF65-F5344CB8AC3E}">
-        <p14:creationId xmlns:p14="http://schemas.microsoft.com/office/powerpoint/2010/main" val="94913341"/>
+        <p14:creationId xmlns:p14="http://schemas.microsoft.com/office/powerpoint/2010/main" val="300750010"/>
       </p:ext>
     </p:extLst>
   </p:cSld>

</xml_diff>